<commit_message>
nouvelle structure et avancement dans l'écriture
</commit_message>
<xml_diff>
--- a/Image/algo_dsc.pptx
+++ b/Image/algo_dsc.pptx
@@ -197,7 +197,7 @@
           <a:p>
             <a:fld id="{84950053-C1AA-47F6-AE44-4D36C0B0F030}" type="datetimeFigureOut">
               <a:rPr lang="fr-BE" smtClean="0"/>
-              <a:t>06-08-20</a:t>
+              <a:t>09-08-20</a:t>
             </a:fld>
             <a:endParaRPr lang="fr-BE"/>
           </a:p>
@@ -698,7 +698,7 @@
           <a:p>
             <a:fld id="{7A871901-3B88-419E-8C28-B6CE5D94EC31}" type="datetimeFigureOut">
               <a:rPr lang="fr-BE" smtClean="0"/>
-              <a:t>06-08-20</a:t>
+              <a:t>09-08-20</a:t>
             </a:fld>
             <a:endParaRPr lang="fr-BE"/>
           </a:p>
@@ -898,7 +898,7 @@
           <a:p>
             <a:fld id="{7A871901-3B88-419E-8C28-B6CE5D94EC31}" type="datetimeFigureOut">
               <a:rPr lang="fr-BE" smtClean="0"/>
-              <a:t>06-08-20</a:t>
+              <a:t>09-08-20</a:t>
             </a:fld>
             <a:endParaRPr lang="fr-BE"/>
           </a:p>
@@ -1108,7 +1108,7 @@
           <a:p>
             <a:fld id="{7A871901-3B88-419E-8C28-B6CE5D94EC31}" type="datetimeFigureOut">
               <a:rPr lang="fr-BE" smtClean="0"/>
-              <a:t>06-08-20</a:t>
+              <a:t>09-08-20</a:t>
             </a:fld>
             <a:endParaRPr lang="fr-BE"/>
           </a:p>
@@ -1308,7 +1308,7 @@
           <a:p>
             <a:fld id="{7A871901-3B88-419E-8C28-B6CE5D94EC31}" type="datetimeFigureOut">
               <a:rPr lang="fr-BE" smtClean="0"/>
-              <a:t>06-08-20</a:t>
+              <a:t>09-08-20</a:t>
             </a:fld>
             <a:endParaRPr lang="fr-BE"/>
           </a:p>
@@ -1584,7 +1584,7 @@
           <a:p>
             <a:fld id="{7A871901-3B88-419E-8C28-B6CE5D94EC31}" type="datetimeFigureOut">
               <a:rPr lang="fr-BE" smtClean="0"/>
-              <a:t>06-08-20</a:t>
+              <a:t>09-08-20</a:t>
             </a:fld>
             <a:endParaRPr lang="fr-BE"/>
           </a:p>
@@ -1852,7 +1852,7 @@
           <a:p>
             <a:fld id="{7A871901-3B88-419E-8C28-B6CE5D94EC31}" type="datetimeFigureOut">
               <a:rPr lang="fr-BE" smtClean="0"/>
-              <a:t>06-08-20</a:t>
+              <a:t>09-08-20</a:t>
             </a:fld>
             <a:endParaRPr lang="fr-BE"/>
           </a:p>
@@ -2267,7 +2267,7 @@
           <a:p>
             <a:fld id="{7A871901-3B88-419E-8C28-B6CE5D94EC31}" type="datetimeFigureOut">
               <a:rPr lang="fr-BE" smtClean="0"/>
-              <a:t>06-08-20</a:t>
+              <a:t>09-08-20</a:t>
             </a:fld>
             <a:endParaRPr lang="fr-BE"/>
           </a:p>
@@ -2409,7 +2409,7 @@
           <a:p>
             <a:fld id="{7A871901-3B88-419E-8C28-B6CE5D94EC31}" type="datetimeFigureOut">
               <a:rPr lang="fr-BE" smtClean="0"/>
-              <a:t>06-08-20</a:t>
+              <a:t>09-08-20</a:t>
             </a:fld>
             <a:endParaRPr lang="fr-BE"/>
           </a:p>
@@ -2522,7 +2522,7 @@
           <a:p>
             <a:fld id="{7A871901-3B88-419E-8C28-B6CE5D94EC31}" type="datetimeFigureOut">
               <a:rPr lang="fr-BE" smtClean="0"/>
-              <a:t>06-08-20</a:t>
+              <a:t>09-08-20</a:t>
             </a:fld>
             <a:endParaRPr lang="fr-BE"/>
           </a:p>
@@ -2835,7 +2835,7 @@
           <a:p>
             <a:fld id="{7A871901-3B88-419E-8C28-B6CE5D94EC31}" type="datetimeFigureOut">
               <a:rPr lang="fr-BE" smtClean="0"/>
-              <a:t>06-08-20</a:t>
+              <a:t>09-08-20</a:t>
             </a:fld>
             <a:endParaRPr lang="fr-BE"/>
           </a:p>
@@ -3124,7 +3124,7 @@
           <a:p>
             <a:fld id="{7A871901-3B88-419E-8C28-B6CE5D94EC31}" type="datetimeFigureOut">
               <a:rPr lang="fr-BE" smtClean="0"/>
-              <a:t>06-08-20</a:t>
+              <a:t>09-08-20</a:t>
             </a:fld>
             <a:endParaRPr lang="fr-BE"/>
           </a:p>
@@ -3367,7 +3367,7 @@
           <a:p>
             <a:fld id="{7A871901-3B88-419E-8C28-B6CE5D94EC31}" type="datetimeFigureOut">
               <a:rPr lang="fr-BE" smtClean="0"/>
-              <a:t>06-08-20</a:t>
+              <a:t>09-08-20</a:t>
             </a:fld>
             <a:endParaRPr lang="fr-BE"/>
           </a:p>
@@ -14428,7 +14428,7 @@
         </p:nvCxnSpPr>
         <p:spPr>
           <a:xfrm flipV="1">
-            <a:off x="3356181" y="4565351"/>
+            <a:off x="1088259" y="4566661"/>
             <a:ext cx="909402" cy="893875"/>
           </a:xfrm>
           <a:prstGeom prst="straightConnector1">
@@ -14468,7 +14468,7 @@
         </p:nvSpPr>
         <p:spPr>
           <a:xfrm>
-            <a:off x="3913113" y="4864491"/>
+            <a:off x="1547025" y="4873109"/>
             <a:ext cx="698694" cy="369332"/>
           </a:xfrm>
           <a:prstGeom prst="rect">
@@ -14506,8 +14506,8 @@
         </p:nvCxnSpPr>
         <p:spPr>
           <a:xfrm flipV="1">
-            <a:off x="10372642" y="3627230"/>
-            <a:ext cx="252353" cy="250591"/>
+            <a:off x="3517245" y="4618294"/>
+            <a:ext cx="788768" cy="820976"/>
           </a:xfrm>
           <a:prstGeom prst="straightConnector1">
             <a:avLst/>
@@ -14536,10 +14536,10 @@
       </p:cxnSp>
       <p:cxnSp>
         <p:nvCxnSpPr>
-          <p:cNvPr id="374" name="Connecteur droit avec flèche 373">
-            <a:extLst>
-              <a:ext uri="{FF2B5EF4-FFF2-40B4-BE49-F238E27FC236}">
-                <a16:creationId xmlns:a16="http://schemas.microsoft.com/office/drawing/2014/main" id="{DE05A2A8-55AD-4B5C-932D-E8853EC65096}"/>
+          <p:cNvPr id="380" name="Connecteur droit avec flèche 379">
+            <a:extLst>
+              <a:ext uri="{FF2B5EF4-FFF2-40B4-BE49-F238E27FC236}">
+                <a16:creationId xmlns:a16="http://schemas.microsoft.com/office/drawing/2014/main" id="{D727ECA8-FF7E-4D55-887A-F20BED3A966D}"/>
               </a:ext>
             </a:extLst>
           </p:cNvPr>
@@ -14550,8 +14550,8 @@
         </p:nvCxnSpPr>
         <p:spPr>
           <a:xfrm flipV="1">
-            <a:off x="8258916" y="3751253"/>
-            <a:ext cx="159813" cy="164306"/>
+            <a:off x="10361998" y="3575356"/>
+            <a:ext cx="330223" cy="322607"/>
           </a:xfrm>
           <a:prstGeom prst="straightConnector1">
             <a:avLst/>
@@ -14580,10 +14580,10 @@
       </p:cxnSp>
       <p:cxnSp>
         <p:nvCxnSpPr>
-          <p:cNvPr id="378" name="Connecteur droit avec flèche 377">
-            <a:extLst>
-              <a:ext uri="{FF2B5EF4-FFF2-40B4-BE49-F238E27FC236}">
-                <a16:creationId xmlns:a16="http://schemas.microsoft.com/office/drawing/2014/main" id="{9E5B4196-1C3F-43D7-AFFE-812A7829657C}"/>
+          <p:cNvPr id="382" name="Connecteur droit avec flèche 381">
+            <a:extLst>
+              <a:ext uri="{FF2B5EF4-FFF2-40B4-BE49-F238E27FC236}">
+                <a16:creationId xmlns:a16="http://schemas.microsoft.com/office/drawing/2014/main" id="{D54F2D37-4C5B-4EC9-AB30-1B9FD0CA0B29}"/>
               </a:ext>
             </a:extLst>
           </p:cNvPr>
@@ -14593,9 +14593,141 @@
           <p:nvPr/>
         </p:nvCxnSpPr>
         <p:spPr>
-          <a:xfrm flipV="1">
-            <a:off x="8198002" y="4247117"/>
-            <a:ext cx="169898" cy="140973"/>
+          <a:xfrm>
+            <a:off x="-8535" y="6538616"/>
+            <a:ext cx="375701" cy="0"/>
+          </a:xfrm>
+          <a:prstGeom prst="straightConnector1">
+            <a:avLst/>
+          </a:prstGeom>
+          <a:ln w="38100">
+            <a:solidFill>
+              <a:srgbClr val="6699FF"/>
+            </a:solidFill>
+            <a:tailEnd type="triangle"/>
+          </a:ln>
+        </p:spPr>
+        <p:style>
+          <a:lnRef idx="1">
+            <a:schemeClr val="accent1"/>
+          </a:lnRef>
+          <a:fillRef idx="0">
+            <a:schemeClr val="accent1"/>
+          </a:fillRef>
+          <a:effectRef idx="0">
+            <a:schemeClr val="accent1"/>
+          </a:effectRef>
+          <a:fontRef idx="minor">
+            <a:schemeClr val="tx1"/>
+          </a:fontRef>
+        </p:style>
+      </p:cxnSp>
+      <p:cxnSp>
+        <p:nvCxnSpPr>
+          <p:cNvPr id="384" name="Connecteur droit avec flèche 383">
+            <a:extLst>
+              <a:ext uri="{FF2B5EF4-FFF2-40B4-BE49-F238E27FC236}">
+                <a16:creationId xmlns:a16="http://schemas.microsoft.com/office/drawing/2014/main" id="{E7441F1B-1A44-4EBC-96AD-43193CC0C6EB}"/>
+              </a:ext>
+            </a:extLst>
+          </p:cNvPr>
+          <p:cNvCxnSpPr>
+            <a:cxnSpLocks/>
+          </p:cNvCxnSpPr>
+          <p:nvPr/>
+        </p:nvCxnSpPr>
+        <p:spPr>
+          <a:xfrm>
+            <a:off x="3206" y="6361090"/>
+            <a:ext cx="375701" cy="0"/>
+          </a:xfrm>
+          <a:prstGeom prst="straightConnector1">
+            <a:avLst/>
+          </a:prstGeom>
+          <a:ln w="38100">
+            <a:solidFill>
+              <a:schemeClr val="accent6"/>
+            </a:solidFill>
+            <a:tailEnd type="triangle"/>
+          </a:ln>
+        </p:spPr>
+        <p:style>
+          <a:lnRef idx="1">
+            <a:schemeClr val="accent1"/>
+          </a:lnRef>
+          <a:fillRef idx="0">
+            <a:schemeClr val="accent1"/>
+          </a:fillRef>
+          <a:effectRef idx="0">
+            <a:schemeClr val="accent1"/>
+          </a:effectRef>
+          <a:fontRef idx="minor">
+            <a:schemeClr val="tx1"/>
+          </a:fontRef>
+        </p:style>
+      </p:cxnSp>
+      <p:cxnSp>
+        <p:nvCxnSpPr>
+          <p:cNvPr id="386" name="Connecteur droit avec flèche 385">
+            <a:extLst>
+              <a:ext uri="{FF2B5EF4-FFF2-40B4-BE49-F238E27FC236}">
+                <a16:creationId xmlns:a16="http://schemas.microsoft.com/office/drawing/2014/main" id="{C6C6A1FF-030B-408C-B04D-D01055F735CA}"/>
+              </a:ext>
+            </a:extLst>
+          </p:cNvPr>
+          <p:cNvCxnSpPr>
+            <a:cxnSpLocks/>
+          </p:cNvCxnSpPr>
+          <p:nvPr/>
+        </p:nvCxnSpPr>
+        <p:spPr>
+          <a:xfrm>
+            <a:off x="-11436" y="6738715"/>
+            <a:ext cx="375701" cy="0"/>
+          </a:xfrm>
+          <a:prstGeom prst="straightConnector1">
+            <a:avLst/>
+          </a:prstGeom>
+          <a:ln w="38100">
+            <a:solidFill>
+              <a:schemeClr val="accent4"/>
+            </a:solidFill>
+            <a:tailEnd type="triangle"/>
+          </a:ln>
+        </p:spPr>
+        <p:style>
+          <a:lnRef idx="1">
+            <a:schemeClr val="accent1"/>
+          </a:lnRef>
+          <a:fillRef idx="0">
+            <a:schemeClr val="accent1"/>
+          </a:fillRef>
+          <a:effectRef idx="0">
+            <a:schemeClr val="accent1"/>
+          </a:effectRef>
+          <a:fontRef idx="minor">
+            <a:schemeClr val="tx1"/>
+          </a:fontRef>
+        </p:style>
+      </p:cxnSp>
+      <p:cxnSp>
+        <p:nvCxnSpPr>
+          <p:cNvPr id="388" name="Connecteur droit avec flèche 387">
+            <a:extLst>
+              <a:ext uri="{FF2B5EF4-FFF2-40B4-BE49-F238E27FC236}">
+                <a16:creationId xmlns:a16="http://schemas.microsoft.com/office/drawing/2014/main" id="{0A98E444-8E4F-4768-9950-6E09BCA5D8FA}"/>
+              </a:ext>
+            </a:extLst>
+          </p:cNvPr>
+          <p:cNvCxnSpPr>
+            <a:cxnSpLocks/>
+          </p:cNvCxnSpPr>
+          <p:nvPr/>
+        </p:nvCxnSpPr>
+        <p:spPr>
+          <a:xfrm>
+            <a:off x="-6" y="6154762"/>
+            <a:ext cx="375701" cy="0"/>
           </a:xfrm>
           <a:prstGeom prst="straightConnector1">
             <a:avLst/>
@@ -14624,226 +14756,6 @@
       </p:cxnSp>
       <p:cxnSp>
         <p:nvCxnSpPr>
-          <p:cNvPr id="380" name="Connecteur droit avec flèche 379">
-            <a:extLst>
-              <a:ext uri="{FF2B5EF4-FFF2-40B4-BE49-F238E27FC236}">
-                <a16:creationId xmlns:a16="http://schemas.microsoft.com/office/drawing/2014/main" id="{D727ECA8-FF7E-4D55-887A-F20BED3A966D}"/>
-              </a:ext>
-            </a:extLst>
-          </p:cNvPr>
-          <p:cNvCxnSpPr>
-            <a:cxnSpLocks/>
-          </p:cNvCxnSpPr>
-          <p:nvPr/>
-        </p:nvCxnSpPr>
-        <p:spPr>
-          <a:xfrm flipV="1">
-            <a:off x="8208418" y="4758596"/>
-            <a:ext cx="140207" cy="158114"/>
-          </a:xfrm>
-          <a:prstGeom prst="straightConnector1">
-            <a:avLst/>
-          </a:prstGeom>
-          <a:ln w="38100">
-            <a:solidFill>
-              <a:srgbClr val="660066"/>
-            </a:solidFill>
-            <a:tailEnd type="triangle"/>
-          </a:ln>
-        </p:spPr>
-        <p:style>
-          <a:lnRef idx="1">
-            <a:schemeClr val="accent1"/>
-          </a:lnRef>
-          <a:fillRef idx="0">
-            <a:schemeClr val="accent1"/>
-          </a:fillRef>
-          <a:effectRef idx="0">
-            <a:schemeClr val="accent1"/>
-          </a:effectRef>
-          <a:fontRef idx="minor">
-            <a:schemeClr val="tx1"/>
-          </a:fontRef>
-        </p:style>
-      </p:cxnSp>
-      <p:cxnSp>
-        <p:nvCxnSpPr>
-          <p:cNvPr id="382" name="Connecteur droit avec flèche 381">
-            <a:extLst>
-              <a:ext uri="{FF2B5EF4-FFF2-40B4-BE49-F238E27FC236}">
-                <a16:creationId xmlns:a16="http://schemas.microsoft.com/office/drawing/2014/main" id="{D54F2D37-4C5B-4EC9-AB30-1B9FD0CA0B29}"/>
-              </a:ext>
-            </a:extLst>
-          </p:cNvPr>
-          <p:cNvCxnSpPr>
-            <a:cxnSpLocks/>
-          </p:cNvCxnSpPr>
-          <p:nvPr/>
-        </p:nvCxnSpPr>
-        <p:spPr>
-          <a:xfrm>
-            <a:off x="-15353" y="6333832"/>
-            <a:ext cx="375701" cy="0"/>
-          </a:xfrm>
-          <a:prstGeom prst="straightConnector1">
-            <a:avLst/>
-          </a:prstGeom>
-          <a:ln w="38100">
-            <a:solidFill>
-              <a:srgbClr val="6699FF"/>
-            </a:solidFill>
-            <a:tailEnd type="triangle"/>
-          </a:ln>
-        </p:spPr>
-        <p:style>
-          <a:lnRef idx="1">
-            <a:schemeClr val="accent1"/>
-          </a:lnRef>
-          <a:fillRef idx="0">
-            <a:schemeClr val="accent1"/>
-          </a:fillRef>
-          <a:effectRef idx="0">
-            <a:schemeClr val="accent1"/>
-          </a:effectRef>
-          <a:fontRef idx="minor">
-            <a:schemeClr val="tx1"/>
-          </a:fontRef>
-        </p:style>
-      </p:cxnSp>
-      <p:cxnSp>
-        <p:nvCxnSpPr>
-          <p:cNvPr id="384" name="Connecteur droit avec flèche 383">
-            <a:extLst>
-              <a:ext uri="{FF2B5EF4-FFF2-40B4-BE49-F238E27FC236}">
-                <a16:creationId xmlns:a16="http://schemas.microsoft.com/office/drawing/2014/main" id="{E7441F1B-1A44-4EBC-96AD-43193CC0C6EB}"/>
-              </a:ext>
-            </a:extLst>
-          </p:cNvPr>
-          <p:cNvCxnSpPr>
-            <a:cxnSpLocks/>
-          </p:cNvCxnSpPr>
-          <p:nvPr/>
-        </p:nvCxnSpPr>
-        <p:spPr>
-          <a:xfrm>
-            <a:off x="0" y="6533998"/>
-            <a:ext cx="375701" cy="0"/>
-          </a:xfrm>
-          <a:prstGeom prst="straightConnector1">
-            <a:avLst/>
-          </a:prstGeom>
-          <a:ln w="38100">
-            <a:solidFill>
-              <a:schemeClr val="accent6"/>
-            </a:solidFill>
-            <a:tailEnd type="triangle"/>
-          </a:ln>
-        </p:spPr>
-        <p:style>
-          <a:lnRef idx="1">
-            <a:schemeClr val="accent1"/>
-          </a:lnRef>
-          <a:fillRef idx="0">
-            <a:schemeClr val="accent1"/>
-          </a:fillRef>
-          <a:effectRef idx="0">
-            <a:schemeClr val="accent1"/>
-          </a:effectRef>
-          <a:fontRef idx="minor">
-            <a:schemeClr val="tx1"/>
-          </a:fontRef>
-        </p:style>
-      </p:cxnSp>
-      <p:cxnSp>
-        <p:nvCxnSpPr>
-          <p:cNvPr id="386" name="Connecteur droit avec flèche 385">
-            <a:extLst>
-              <a:ext uri="{FF2B5EF4-FFF2-40B4-BE49-F238E27FC236}">
-                <a16:creationId xmlns:a16="http://schemas.microsoft.com/office/drawing/2014/main" id="{C6C6A1FF-030B-408C-B04D-D01055F735CA}"/>
-              </a:ext>
-            </a:extLst>
-          </p:cNvPr>
-          <p:cNvCxnSpPr>
-            <a:cxnSpLocks/>
-          </p:cNvCxnSpPr>
-          <p:nvPr/>
-        </p:nvCxnSpPr>
-        <p:spPr>
-          <a:xfrm>
-            <a:off x="-11436" y="6738715"/>
-            <a:ext cx="375701" cy="0"/>
-          </a:xfrm>
-          <a:prstGeom prst="straightConnector1">
-            <a:avLst/>
-          </a:prstGeom>
-          <a:ln w="38100">
-            <a:solidFill>
-              <a:schemeClr val="accent4"/>
-            </a:solidFill>
-            <a:tailEnd type="triangle"/>
-          </a:ln>
-        </p:spPr>
-        <p:style>
-          <a:lnRef idx="1">
-            <a:schemeClr val="accent1"/>
-          </a:lnRef>
-          <a:fillRef idx="0">
-            <a:schemeClr val="accent1"/>
-          </a:fillRef>
-          <a:effectRef idx="0">
-            <a:schemeClr val="accent1"/>
-          </a:effectRef>
-          <a:fontRef idx="minor">
-            <a:schemeClr val="tx1"/>
-          </a:fontRef>
-        </p:style>
-      </p:cxnSp>
-      <p:cxnSp>
-        <p:nvCxnSpPr>
-          <p:cNvPr id="388" name="Connecteur droit avec flèche 387">
-            <a:extLst>
-              <a:ext uri="{FF2B5EF4-FFF2-40B4-BE49-F238E27FC236}">
-                <a16:creationId xmlns:a16="http://schemas.microsoft.com/office/drawing/2014/main" id="{0A98E444-8E4F-4768-9950-6E09BCA5D8FA}"/>
-              </a:ext>
-            </a:extLst>
-          </p:cNvPr>
-          <p:cNvCxnSpPr>
-            <a:cxnSpLocks/>
-          </p:cNvCxnSpPr>
-          <p:nvPr/>
-        </p:nvCxnSpPr>
-        <p:spPr>
-          <a:xfrm>
-            <a:off x="-6" y="6154762"/>
-            <a:ext cx="375701" cy="0"/>
-          </a:xfrm>
-          <a:prstGeom prst="straightConnector1">
-            <a:avLst/>
-          </a:prstGeom>
-          <a:ln w="38100">
-            <a:solidFill>
-              <a:srgbClr val="660066"/>
-            </a:solidFill>
-            <a:tailEnd type="triangle"/>
-          </a:ln>
-        </p:spPr>
-        <p:style>
-          <a:lnRef idx="1">
-            <a:schemeClr val="accent1"/>
-          </a:lnRef>
-          <a:fillRef idx="0">
-            <a:schemeClr val="accent1"/>
-          </a:fillRef>
-          <a:effectRef idx="0">
-            <a:schemeClr val="accent1"/>
-          </a:effectRef>
-          <a:fontRef idx="minor">
-            <a:schemeClr val="tx1"/>
-          </a:fontRef>
-        </p:style>
-      </p:cxnSp>
-      <p:cxnSp>
-        <p:nvCxnSpPr>
           <p:cNvPr id="390" name="Connecteur droit avec flèche 389">
             <a:extLst>
               <a:ext uri="{FF2B5EF4-FFF2-40B4-BE49-F238E27FC236}">
@@ -14995,9 +14907,21 @@
           <a:p>
             <a:r>
               <a:rPr lang="fr-BE" dirty="0"/>
-              <a:t>: Loop 1</a:t>
+              <a:t>: </a:t>
             </a:r>
-            <a:endParaRPr lang="fr-FR" dirty="0"/>
+            <a:r>
+              <a:rPr lang="fr-BE" dirty="0">
+                <a:solidFill>
+                  <a:srgbClr val="7030A0"/>
+                </a:solidFill>
+              </a:rPr>
+              <a:t>Loop 1</a:t>
+            </a:r>
+            <a:endParaRPr lang="fr-FR" dirty="0">
+              <a:solidFill>
+                <a:srgbClr val="7030A0"/>
+              </a:solidFill>
+            </a:endParaRPr>
           </a:p>
         </p:txBody>
       </p:sp>
@@ -15031,9 +14955,21 @@
           <a:p>
             <a:r>
               <a:rPr lang="fr-BE" dirty="0"/>
-              <a:t>: Loop 2</a:t>
+              <a:t>: </a:t>
             </a:r>
-            <a:endParaRPr lang="fr-FR" dirty="0"/>
+            <a:r>
+              <a:rPr lang="fr-BE" dirty="0">
+                <a:solidFill>
+                  <a:schemeClr val="accent6"/>
+                </a:solidFill>
+              </a:rPr>
+              <a:t>Loop 2</a:t>
+            </a:r>
+            <a:endParaRPr lang="fr-FR" dirty="0">
+              <a:solidFill>
+                <a:schemeClr val="accent6"/>
+              </a:solidFill>
+            </a:endParaRPr>
           </a:p>
         </p:txBody>
       </p:sp>
@@ -15067,9 +15003,21 @@
           <a:p>
             <a:r>
               <a:rPr lang="fr-BE" dirty="0"/>
-              <a:t>: Loop 3</a:t>
+              <a:t>: </a:t>
             </a:r>
-            <a:endParaRPr lang="fr-FR" dirty="0"/>
+            <a:r>
+              <a:rPr lang="fr-BE" dirty="0">
+                <a:solidFill>
+                  <a:schemeClr val="accent5"/>
+                </a:solidFill>
+              </a:rPr>
+              <a:t>Loop 3</a:t>
+            </a:r>
+            <a:endParaRPr lang="fr-FR" dirty="0">
+              <a:solidFill>
+                <a:schemeClr val="accent5"/>
+              </a:solidFill>
+            </a:endParaRPr>
           </a:p>
         </p:txBody>
       </p:sp>
@@ -15103,9 +15051,21 @@
           <a:p>
             <a:r>
               <a:rPr lang="fr-BE" dirty="0"/>
-              <a:t>: Loop 4</a:t>
+              <a:t>: </a:t>
             </a:r>
-            <a:endParaRPr lang="fr-FR" dirty="0"/>
+            <a:r>
+              <a:rPr lang="fr-BE" dirty="0">
+                <a:solidFill>
+                  <a:schemeClr val="accent4"/>
+                </a:solidFill>
+              </a:rPr>
+              <a:t>Loop 4</a:t>
+            </a:r>
+            <a:endParaRPr lang="fr-FR" dirty="0">
+              <a:solidFill>
+                <a:schemeClr val="accent4"/>
+              </a:solidFill>
+            </a:endParaRPr>
           </a:p>
         </p:txBody>
       </p:sp>

</xml_diff>